<commit_message>
revised some ppt template formats
</commit_message>
<xml_diff>
--- a/docs/products/business_case_furniture.pptx
+++ b/docs/products/business_case_furniture.pptx
@@ -5,8 +5,8 @@
     <p:sldMasterId id="2147483648" r:id="rId1"/>
   </p:sldMasterIdLst>
   <p:sldIdLst>
-    <p:sldId id="259" r:id="rId3"/>
-    <p:sldId id="260" r:id="rId4"/>
+    <p:sldId id="259" r:id="rId2"/>
+    <p:sldId id="260" r:id="rId3"/>
   </p:sldIdLst>
   <p:sldSz cx="9144000" cy="6858000" type="screen4x3"/>
   <p:notesSz cx="6858000" cy="9144000"/>
@@ -289,6 +289,7 @@
           <a:p>
             <a:fld id="{8D52E752-28E5-4368-B467-FD45E17F2D0E}" type="datetimeFigureOut">
               <a:rPr lang="en-US" smtClean="0"/>
+              <a:t>9/21/2017</a:t>
             </a:fld>
             <a:endParaRPr lang="en-US"/>
           </a:p>
@@ -330,6 +331,7 @@
           <a:p>
             <a:fld id="{24EAE0EF-B234-4381-877B-176780D00FD9}" type="slidenum">
               <a:rPr lang="en-US" smtClean="0"/>
+              <a:t>‹#›</a:t>
             </a:fld>
             <a:endParaRPr lang="en-US"/>
           </a:p>
@@ -403,7 +405,6 @@
               <a:rPr lang="en-US" smtClean="0"/>
               <a:t>Click to edit Master text styles</a:t>
             </a:r>
-            <a:endParaRPr lang="en-US" smtClean="0"/>
           </a:p>
           <a:p>
             <a:pPr lvl="1"/>
@@ -411,7 +412,6 @@
               <a:rPr lang="en-US" smtClean="0"/>
               <a:t>Second level</a:t>
             </a:r>
-            <a:endParaRPr lang="en-US" smtClean="0"/>
           </a:p>
           <a:p>
             <a:pPr lvl="2"/>
@@ -419,7 +419,6 @@
               <a:rPr lang="en-US" smtClean="0"/>
               <a:t>Third level</a:t>
             </a:r>
-            <a:endParaRPr lang="en-US" smtClean="0"/>
           </a:p>
           <a:p>
             <a:pPr lvl="3"/>
@@ -427,7 +426,6 @@
               <a:rPr lang="en-US" smtClean="0"/>
               <a:t>Fourth level</a:t>
             </a:r>
-            <a:endParaRPr lang="en-US" smtClean="0"/>
           </a:p>
           <a:p>
             <a:pPr lvl="4"/>
@@ -456,6 +454,7 @@
           <a:p>
             <a:fld id="{8D52E752-28E5-4368-B467-FD45E17F2D0E}" type="datetimeFigureOut">
               <a:rPr lang="en-US" smtClean="0"/>
+              <a:t>9/21/2017</a:t>
             </a:fld>
             <a:endParaRPr lang="en-US"/>
           </a:p>
@@ -497,6 +496,7 @@
           <a:p>
             <a:fld id="{24EAE0EF-B234-4381-877B-176780D00FD9}" type="slidenum">
               <a:rPr lang="en-US" smtClean="0"/>
+              <a:t>‹#›</a:t>
             </a:fld>
             <a:endParaRPr lang="en-US"/>
           </a:p>
@@ -580,7 +580,6 @@
               <a:rPr lang="en-US" smtClean="0"/>
               <a:t>Click to edit Master text styles</a:t>
             </a:r>
-            <a:endParaRPr lang="en-US" smtClean="0"/>
           </a:p>
           <a:p>
             <a:pPr lvl="1"/>
@@ -588,7 +587,6 @@
               <a:rPr lang="en-US" smtClean="0"/>
               <a:t>Second level</a:t>
             </a:r>
-            <a:endParaRPr lang="en-US" smtClean="0"/>
           </a:p>
           <a:p>
             <a:pPr lvl="2"/>
@@ -596,7 +594,6 @@
               <a:rPr lang="en-US" smtClean="0"/>
               <a:t>Third level</a:t>
             </a:r>
-            <a:endParaRPr lang="en-US" smtClean="0"/>
           </a:p>
           <a:p>
             <a:pPr lvl="3"/>
@@ -604,7 +601,6 @@
               <a:rPr lang="en-US" smtClean="0"/>
               <a:t>Fourth level</a:t>
             </a:r>
-            <a:endParaRPr lang="en-US" smtClean="0"/>
           </a:p>
           <a:p>
             <a:pPr lvl="4"/>
@@ -633,6 +629,7 @@
           <a:p>
             <a:fld id="{8D52E752-28E5-4368-B467-FD45E17F2D0E}" type="datetimeFigureOut">
               <a:rPr lang="en-US" smtClean="0"/>
+              <a:t>9/21/2017</a:t>
             </a:fld>
             <a:endParaRPr lang="en-US"/>
           </a:p>
@@ -674,6 +671,7 @@
           <a:p>
             <a:fld id="{24EAE0EF-B234-4381-877B-176780D00FD9}" type="slidenum">
               <a:rPr lang="en-US" smtClean="0"/>
+              <a:t>‹#›</a:t>
             </a:fld>
             <a:endParaRPr lang="en-US"/>
           </a:p>
@@ -747,7 +745,6 @@
               <a:rPr lang="en-US" smtClean="0"/>
               <a:t>Click to edit Master text styles</a:t>
             </a:r>
-            <a:endParaRPr lang="en-US" smtClean="0"/>
           </a:p>
           <a:p>
             <a:pPr lvl="1"/>
@@ -755,7 +752,6 @@
               <a:rPr lang="en-US" smtClean="0"/>
               <a:t>Second level</a:t>
             </a:r>
-            <a:endParaRPr lang="en-US" smtClean="0"/>
           </a:p>
           <a:p>
             <a:pPr lvl="2"/>
@@ -763,7 +759,6 @@
               <a:rPr lang="en-US" smtClean="0"/>
               <a:t>Third level</a:t>
             </a:r>
-            <a:endParaRPr lang="en-US" smtClean="0"/>
           </a:p>
           <a:p>
             <a:pPr lvl="3"/>
@@ -771,7 +766,6 @@
               <a:rPr lang="en-US" smtClean="0"/>
               <a:t>Fourth level</a:t>
             </a:r>
-            <a:endParaRPr lang="en-US" smtClean="0"/>
           </a:p>
           <a:p>
             <a:pPr lvl="4"/>
@@ -800,6 +794,7 @@
           <a:p>
             <a:fld id="{8D52E752-28E5-4368-B467-FD45E17F2D0E}" type="datetimeFigureOut">
               <a:rPr lang="en-US" smtClean="0"/>
+              <a:t>9/21/2017</a:t>
             </a:fld>
             <a:endParaRPr lang="en-US"/>
           </a:p>
@@ -841,6 +836,7 @@
           <a:p>
             <a:fld id="{24EAE0EF-B234-4381-877B-176780D00FD9}" type="slidenum">
               <a:rPr lang="en-US" smtClean="0"/>
+              <a:t>‹#›</a:t>
             </a:fld>
             <a:endParaRPr lang="en-US"/>
           </a:p>
@@ -1019,7 +1015,6 @@
               <a:rPr lang="en-US" smtClean="0"/>
               <a:t>Click to edit Master text styles</a:t>
             </a:r>
-            <a:endParaRPr lang="en-US" smtClean="0"/>
           </a:p>
         </p:txBody>
       </p:sp>
@@ -1040,6 +1035,7 @@
           <a:p>
             <a:fld id="{8D52E752-28E5-4368-B467-FD45E17F2D0E}" type="datetimeFigureOut">
               <a:rPr lang="en-US" smtClean="0"/>
+              <a:t>9/21/2017</a:t>
             </a:fld>
             <a:endParaRPr lang="en-US"/>
           </a:p>
@@ -1081,6 +1077,7 @@
           <a:p>
             <a:fld id="{24EAE0EF-B234-4381-877B-176780D00FD9}" type="slidenum">
               <a:rPr lang="en-US" smtClean="0"/>
+              <a:t>‹#›</a:t>
             </a:fld>
             <a:endParaRPr lang="en-US"/>
           </a:p>
@@ -1187,7 +1184,6 @@
               <a:rPr lang="en-US" smtClean="0"/>
               <a:t>Click to edit Master text styles</a:t>
             </a:r>
-            <a:endParaRPr lang="en-US" smtClean="0"/>
           </a:p>
           <a:p>
             <a:pPr lvl="1"/>
@@ -1195,7 +1191,6 @@
               <a:rPr lang="en-US" smtClean="0"/>
               <a:t>Second level</a:t>
             </a:r>
-            <a:endParaRPr lang="en-US" smtClean="0"/>
           </a:p>
           <a:p>
             <a:pPr lvl="2"/>
@@ -1203,7 +1198,6 @@
               <a:rPr lang="en-US" smtClean="0"/>
               <a:t>Third level</a:t>
             </a:r>
-            <a:endParaRPr lang="en-US" smtClean="0"/>
           </a:p>
           <a:p>
             <a:pPr lvl="3"/>
@@ -1211,7 +1205,6 @@
               <a:rPr lang="en-US" smtClean="0"/>
               <a:t>Fourth level</a:t>
             </a:r>
-            <a:endParaRPr lang="en-US" smtClean="0"/>
           </a:p>
           <a:p>
             <a:pPr lvl="4"/>
@@ -1276,7 +1269,6 @@
               <a:rPr lang="en-US" smtClean="0"/>
               <a:t>Click to edit Master text styles</a:t>
             </a:r>
-            <a:endParaRPr lang="en-US" smtClean="0"/>
           </a:p>
           <a:p>
             <a:pPr lvl="1"/>
@@ -1284,7 +1276,6 @@
               <a:rPr lang="en-US" smtClean="0"/>
               <a:t>Second level</a:t>
             </a:r>
-            <a:endParaRPr lang="en-US" smtClean="0"/>
           </a:p>
           <a:p>
             <a:pPr lvl="2"/>
@@ -1292,7 +1283,6 @@
               <a:rPr lang="en-US" smtClean="0"/>
               <a:t>Third level</a:t>
             </a:r>
-            <a:endParaRPr lang="en-US" smtClean="0"/>
           </a:p>
           <a:p>
             <a:pPr lvl="3"/>
@@ -1300,7 +1290,6 @@
               <a:rPr lang="en-US" smtClean="0"/>
               <a:t>Fourth level</a:t>
             </a:r>
-            <a:endParaRPr lang="en-US" smtClean="0"/>
           </a:p>
           <a:p>
             <a:pPr lvl="4"/>
@@ -1329,6 +1318,7 @@
           <a:p>
             <a:fld id="{8D52E752-28E5-4368-B467-FD45E17F2D0E}" type="datetimeFigureOut">
               <a:rPr lang="en-US" smtClean="0"/>
+              <a:t>9/21/2017</a:t>
             </a:fld>
             <a:endParaRPr lang="en-US"/>
           </a:p>
@@ -1370,6 +1360,7 @@
           <a:p>
             <a:fld id="{24EAE0EF-B234-4381-877B-176780D00FD9}" type="slidenum">
               <a:rPr lang="en-US" smtClean="0"/>
+              <a:t>‹#›</a:t>
             </a:fld>
             <a:endParaRPr lang="en-US"/>
           </a:p>
@@ -1489,7 +1480,6 @@
               <a:rPr lang="en-US" smtClean="0"/>
               <a:t>Click to edit Master text styles</a:t>
             </a:r>
-            <a:endParaRPr lang="en-US" smtClean="0"/>
           </a:p>
         </p:txBody>
       </p:sp>
@@ -1546,7 +1536,6 @@
               <a:rPr lang="en-US" smtClean="0"/>
               <a:t>Click to edit Master text styles</a:t>
             </a:r>
-            <a:endParaRPr lang="en-US" smtClean="0"/>
           </a:p>
           <a:p>
             <a:pPr lvl="1"/>
@@ -1554,7 +1543,6 @@
               <a:rPr lang="en-US" smtClean="0"/>
               <a:t>Second level</a:t>
             </a:r>
-            <a:endParaRPr lang="en-US" smtClean="0"/>
           </a:p>
           <a:p>
             <a:pPr lvl="2"/>
@@ -1562,7 +1550,6 @@
               <a:rPr lang="en-US" smtClean="0"/>
               <a:t>Third level</a:t>
             </a:r>
-            <a:endParaRPr lang="en-US" smtClean="0"/>
           </a:p>
           <a:p>
             <a:pPr lvl="3"/>
@@ -1570,7 +1557,6 @@
               <a:rPr lang="en-US" smtClean="0"/>
               <a:t>Fourth level</a:t>
             </a:r>
-            <a:endParaRPr lang="en-US" smtClean="0"/>
           </a:p>
           <a:p>
             <a:pPr lvl="4"/>
@@ -1644,7 +1630,6 @@
               <a:rPr lang="en-US" smtClean="0"/>
               <a:t>Click to edit Master text styles</a:t>
             </a:r>
-            <a:endParaRPr lang="en-US" smtClean="0"/>
           </a:p>
         </p:txBody>
       </p:sp>
@@ -1701,7 +1686,6 @@
               <a:rPr lang="en-US" smtClean="0"/>
               <a:t>Click to edit Master text styles</a:t>
             </a:r>
-            <a:endParaRPr lang="en-US" smtClean="0"/>
           </a:p>
           <a:p>
             <a:pPr lvl="1"/>
@@ -1709,7 +1693,6 @@
               <a:rPr lang="en-US" smtClean="0"/>
               <a:t>Second level</a:t>
             </a:r>
-            <a:endParaRPr lang="en-US" smtClean="0"/>
           </a:p>
           <a:p>
             <a:pPr lvl="2"/>
@@ -1717,7 +1700,6 @@
               <a:rPr lang="en-US" smtClean="0"/>
               <a:t>Third level</a:t>
             </a:r>
-            <a:endParaRPr lang="en-US" smtClean="0"/>
           </a:p>
           <a:p>
             <a:pPr lvl="3"/>
@@ -1725,7 +1707,6 @@
               <a:rPr lang="en-US" smtClean="0"/>
               <a:t>Fourth level</a:t>
             </a:r>
-            <a:endParaRPr lang="en-US" smtClean="0"/>
           </a:p>
           <a:p>
             <a:pPr lvl="4"/>
@@ -1754,6 +1735,7 @@
           <a:p>
             <a:fld id="{8D52E752-28E5-4368-B467-FD45E17F2D0E}" type="datetimeFigureOut">
               <a:rPr lang="en-US" smtClean="0"/>
+              <a:t>9/21/2017</a:t>
             </a:fld>
             <a:endParaRPr lang="en-US"/>
           </a:p>
@@ -1795,6 +1777,7 @@
           <a:p>
             <a:fld id="{24EAE0EF-B234-4381-877B-176780D00FD9}" type="slidenum">
               <a:rPr lang="en-US" smtClean="0"/>
+              <a:t>‹#›</a:t>
             </a:fld>
             <a:endParaRPr lang="en-US"/>
           </a:p>
@@ -1865,6 +1848,7 @@
           <a:p>
             <a:fld id="{8D52E752-28E5-4368-B467-FD45E17F2D0E}" type="datetimeFigureOut">
               <a:rPr lang="en-US" smtClean="0"/>
+              <a:t>9/21/2017</a:t>
             </a:fld>
             <a:endParaRPr lang="en-US"/>
           </a:p>
@@ -1906,6 +1890,7 @@
           <a:p>
             <a:fld id="{24EAE0EF-B234-4381-877B-176780D00FD9}" type="slidenum">
               <a:rPr lang="en-US" smtClean="0"/>
+              <a:t>‹#›</a:t>
             </a:fld>
             <a:endParaRPr lang="en-US"/>
           </a:p>
@@ -1953,6 +1938,7 @@
           <a:p>
             <a:fld id="{8D52E752-28E5-4368-B467-FD45E17F2D0E}" type="datetimeFigureOut">
               <a:rPr lang="en-US" smtClean="0"/>
+              <a:t>9/21/2017</a:t>
             </a:fld>
             <a:endParaRPr lang="en-US"/>
           </a:p>
@@ -1994,6 +1980,7 @@
           <a:p>
             <a:fld id="{24EAE0EF-B234-4381-877B-176780D00FD9}" type="slidenum">
               <a:rPr lang="en-US" smtClean="0"/>
+              <a:t>‹#›</a:t>
             </a:fld>
             <a:endParaRPr lang="en-US"/>
           </a:p>
@@ -2109,7 +2096,6 @@
               <a:rPr lang="en-US" smtClean="0"/>
               <a:t>Click to edit Master text styles</a:t>
             </a:r>
-            <a:endParaRPr lang="en-US" smtClean="0"/>
           </a:p>
           <a:p>
             <a:pPr lvl="1"/>
@@ -2117,7 +2103,6 @@
               <a:rPr lang="en-US" smtClean="0"/>
               <a:t>Second level</a:t>
             </a:r>
-            <a:endParaRPr lang="en-US" smtClean="0"/>
           </a:p>
           <a:p>
             <a:pPr lvl="2"/>
@@ -2125,7 +2110,6 @@
               <a:rPr lang="en-US" smtClean="0"/>
               <a:t>Third level</a:t>
             </a:r>
-            <a:endParaRPr lang="en-US" smtClean="0"/>
           </a:p>
           <a:p>
             <a:pPr lvl="3"/>
@@ -2133,7 +2117,6 @@
               <a:rPr lang="en-US" smtClean="0"/>
               <a:t>Fourth level</a:t>
             </a:r>
-            <a:endParaRPr lang="en-US" smtClean="0"/>
           </a:p>
           <a:p>
             <a:pPr lvl="4"/>
@@ -2207,7 +2190,6 @@
               <a:rPr lang="en-US" smtClean="0"/>
               <a:t>Click to edit Master text styles</a:t>
             </a:r>
-            <a:endParaRPr lang="en-US" smtClean="0"/>
           </a:p>
         </p:txBody>
       </p:sp>
@@ -2228,6 +2210,7 @@
           <a:p>
             <a:fld id="{8D52E752-28E5-4368-B467-FD45E17F2D0E}" type="datetimeFigureOut">
               <a:rPr lang="en-US" smtClean="0"/>
+              <a:t>9/21/2017</a:t>
             </a:fld>
             <a:endParaRPr lang="en-US"/>
           </a:p>
@@ -2269,6 +2252,7 @@
           <a:p>
             <a:fld id="{24EAE0EF-B234-4381-877B-176780D00FD9}" type="slidenum">
               <a:rPr lang="en-US" smtClean="0"/>
+              <a:t>‹#›</a:t>
             </a:fld>
             <a:endParaRPr lang="en-US"/>
           </a:p>
@@ -2454,7 +2438,6 @@
               <a:rPr lang="en-US" smtClean="0"/>
               <a:t>Click to edit Master text styles</a:t>
             </a:r>
-            <a:endParaRPr lang="en-US" smtClean="0"/>
           </a:p>
         </p:txBody>
       </p:sp>
@@ -2475,6 +2458,7 @@
           <a:p>
             <a:fld id="{8D52E752-28E5-4368-B467-FD45E17F2D0E}" type="datetimeFigureOut">
               <a:rPr lang="en-US" smtClean="0"/>
+              <a:t>9/21/2017</a:t>
             </a:fld>
             <a:endParaRPr lang="en-US"/>
           </a:p>
@@ -2516,6 +2500,7 @@
           <a:p>
             <a:fld id="{24EAE0EF-B234-4381-877B-176780D00FD9}" type="slidenum">
               <a:rPr lang="en-US" smtClean="0"/>
+              <a:t>‹#›</a:t>
             </a:fld>
             <a:endParaRPr lang="en-US"/>
           </a:p>
@@ -2620,7 +2605,6 @@
               <a:rPr lang="en-US" smtClean="0"/>
               <a:t>Click to edit Master text styles</a:t>
             </a:r>
-            <a:endParaRPr lang="en-US" smtClean="0"/>
           </a:p>
           <a:p>
             <a:pPr lvl="1"/>
@@ -2628,7 +2612,6 @@
               <a:rPr lang="en-US" smtClean="0"/>
               <a:t>Second level</a:t>
             </a:r>
-            <a:endParaRPr lang="en-US" smtClean="0"/>
           </a:p>
           <a:p>
             <a:pPr lvl="2"/>
@@ -2636,7 +2619,6 @@
               <a:rPr lang="en-US" smtClean="0"/>
               <a:t>Third level</a:t>
             </a:r>
-            <a:endParaRPr lang="en-US" smtClean="0"/>
           </a:p>
           <a:p>
             <a:pPr lvl="3"/>
@@ -2644,7 +2626,6 @@
               <a:rPr lang="en-US" smtClean="0"/>
               <a:t>Fourth level</a:t>
             </a:r>
-            <a:endParaRPr lang="en-US" smtClean="0"/>
           </a:p>
           <a:p>
             <a:pPr lvl="4"/>
@@ -2691,6 +2672,7 @@
           <a:p>
             <a:fld id="{8D52E752-28E5-4368-B467-FD45E17F2D0E}" type="datetimeFigureOut">
               <a:rPr lang="en-US" smtClean="0"/>
+              <a:t>9/21/2017</a:t>
             </a:fld>
             <a:endParaRPr lang="en-US"/>
           </a:p>
@@ -2768,6 +2750,7 @@
           <a:p>
             <a:fld id="{24EAE0EF-B234-4381-877B-176780D00FD9}" type="slidenum">
               <a:rPr lang="en-US" smtClean="0"/>
+              <a:t>‹#›</a:t>
             </a:fld>
             <a:endParaRPr lang="en-US"/>
           </a:p>
@@ -3103,33 +3086,19 @@
               </a:lnSpc>
             </a:pPr>
             <a:r>
-              <a:rPr lang="en-US" b="1">
+              <a:rPr lang="en-US" sz="1600" b="1" i="1" dirty="0" smtClean="0">
                 <a:solidFill>
                   <a:schemeClr val="tx1"/>
                 </a:solidFill>
-                <a:effectLst>
-                  <a:outerShdw blurRad="38100" dist="19050" dir="2700000" algn="tl" rotWithShape="0">
-                    <a:schemeClr val="dk1">
-                      <a:alpha val="40000"/>
-                    </a:schemeClr>
-                  </a:outerShdw>
-                </a:effectLst>
-                <a:latin typeface="+mj-lt"/>
+                <a:latin typeface="Corbel" panose="020B0503020204020204" pitchFamily="34" charset="0"/>
               </a:rPr>
-              <a:t>CASE STUDY - CREATIVE FURNITURE</a:t>
-            </a:r>
-            <a:endParaRPr lang="en-US" b="1">
+              <a:t>Case Study - Creative Furniture</a:t>
+            </a:r>
+            <a:endParaRPr lang="en-US" sz="1600" b="1" i="1" dirty="0">
               <a:solidFill>
                 <a:schemeClr val="tx1"/>
               </a:solidFill>
-              <a:effectLst>
-                <a:outerShdw blurRad="38100" dist="19050" dir="2700000" algn="tl" rotWithShape="0">
-                  <a:schemeClr val="dk1">
-                    <a:alpha val="40000"/>
-                  </a:schemeClr>
-                </a:outerShdw>
-              </a:effectLst>
-              <a:latin typeface="+mj-lt"/>
+              <a:latin typeface="Corbel" panose="020B0503020204020204" pitchFamily="34" charset="0"/>
             </a:endParaRPr>
           </a:p>
         </p:txBody>
@@ -3157,7 +3126,7 @@
             <p:nvPr/>
           </p:nvPicPr>
           <p:blipFill>
-            <a:blip r:embed="rId1"/>
+            <a:blip r:embed="rId2"/>
             <a:stretch>
               <a:fillRect/>
             </a:stretch>
@@ -3181,7 +3150,7 @@
             <p:nvPr/>
           </p:nvPicPr>
           <p:blipFill>
-            <a:blip r:embed="rId2"/>
+            <a:blip r:embed="rId3"/>
             <a:stretch>
               <a:fillRect/>
             </a:stretch>
@@ -3205,7 +3174,7 @@
             <p:nvPr/>
           </p:nvPicPr>
           <p:blipFill>
-            <a:blip r:embed="rId3"/>
+            <a:blip r:embed="rId4"/>
             <a:stretch>
               <a:fillRect/>
             </a:stretch>
@@ -3229,7 +3198,7 @@
             <p:nvPr/>
           </p:nvPicPr>
           <p:blipFill>
-            <a:blip r:embed="rId4"/>
+            <a:blip r:embed="rId5"/>
             <a:stretch>
               <a:fillRect/>
             </a:stretch>
@@ -3253,7 +3222,7 @@
             <p:nvPr/>
           </p:nvPicPr>
           <p:blipFill>
-            <a:blip r:embed="rId5"/>
+            <a:blip r:embed="rId6"/>
             <a:stretch>
               <a:fillRect/>
             </a:stretch>
@@ -3299,6 +3268,7 @@
           </p:style>
           <p:txBody>
             <a:bodyPr rtlCol="0" anchor="ctr"/>
+            <a:lstStyle/>
             <a:p>
               <a:pPr algn="ctr"/>
               <a:endParaRPr lang="en-US" sz="1400" dirty="0" smtClean="0">
@@ -3340,6 +3310,7 @@
           </p:style>
           <p:txBody>
             <a:bodyPr rtlCol="0" anchor="ctr"/>
+            <a:lstStyle/>
             <a:p>
               <a:pPr algn="ctr"/>
               <a:endParaRPr lang="en-US" sz="1400" dirty="0" smtClean="0">
@@ -3396,6 +3367,7 @@
           </p:style>
           <p:txBody>
             <a:bodyPr rtlCol="0" anchor="ctr"/>
+            <a:lstStyle/>
             <a:p>
               <a:pPr algn="ctr"/>
               <a:r>
@@ -3404,9 +3376,6 @@
                 </a:rPr>
                 <a:t>Scanned Object</a:t>
               </a:r>
-              <a:endParaRPr lang="en-US" sz="1400" dirty="0" smtClean="0">
-                <a:latin typeface="Corbel" panose="020B0503020204020204" pitchFamily="34" charset="0"/>
-              </a:endParaRPr>
             </a:p>
           </p:txBody>
         </p:sp>
@@ -3441,6 +3410,7 @@
           </p:style>
           <p:txBody>
             <a:bodyPr rtlCol="0" anchor="ctr"/>
+            <a:lstStyle/>
             <a:p>
               <a:pPr algn="ctr"/>
               <a:r>
@@ -3449,9 +3419,6 @@
                 </a:rPr>
                 <a:t>Design Transformation</a:t>
               </a:r>
-              <a:endParaRPr lang="en-US" sz="1400" dirty="0" smtClean="0">
-                <a:latin typeface="Corbel" panose="020B0503020204020204" pitchFamily="34" charset="0"/>
-              </a:endParaRPr>
             </a:p>
           </p:txBody>
         </p:sp>
@@ -3486,6 +3453,7 @@
           </p:style>
           <p:txBody>
             <a:bodyPr rtlCol="0" anchor="ctr"/>
+            <a:lstStyle/>
             <a:p>
               <a:pPr algn="ctr"/>
               <a:r>
@@ -3494,9 +3462,6 @@
                 </a:rPr>
                 <a:t>Creative Furniture</a:t>
               </a:r>
-              <a:endParaRPr lang="en-US" sz="1400" dirty="0" smtClean="0">
-                <a:latin typeface="Corbel" panose="020B0503020204020204" pitchFamily="34" charset="0"/>
-              </a:endParaRPr>
             </a:p>
           </p:txBody>
         </p:sp>
@@ -3531,6 +3496,7 @@
           </p:style>
           <p:txBody>
             <a:bodyPr rtlCol="0" anchor="ctr"/>
+            <a:lstStyle/>
             <a:p>
               <a:pPr algn="ctr"/>
               <a:r>
@@ -3539,9 +3505,6 @@
                 </a:rPr>
                 <a:t>Local Print / Deliever / Install</a:t>
               </a:r>
-              <a:endParaRPr lang="en-US" sz="1400" dirty="0" smtClean="0">
-                <a:latin typeface="Corbel" panose="020B0503020204020204" pitchFamily="34" charset="0"/>
-              </a:endParaRPr>
             </a:p>
           </p:txBody>
         </p:sp>
@@ -3576,6 +3539,7 @@
           </p:style>
           <p:txBody>
             <a:bodyPr rtlCol="0" anchor="ctr"/>
+            <a:lstStyle/>
             <a:p>
               <a:pPr algn="ctr"/>
               <a:r>
@@ -3584,9 +3548,6 @@
                 </a:rPr>
                 <a:t>Furniture Store (e.g., IKEA)</a:t>
               </a:r>
-              <a:endParaRPr lang="en-US" sz="1400" dirty="0" smtClean="0">
-                <a:latin typeface="Corbel" panose="020B0503020204020204" pitchFamily="34" charset="0"/>
-              </a:endParaRPr>
             </a:p>
           </p:txBody>
         </p:sp>
@@ -3621,6 +3582,7 @@
           </p:style>
           <p:txBody>
             <a:bodyPr rtlCol="0" anchor="ctr"/>
+            <a:lstStyle/>
             <a:p>
               <a:pPr algn="ctr"/>
               <a:endParaRPr lang="en-US" sz="1400" dirty="0" smtClean="0"/>
@@ -3658,6 +3620,7 @@
           </p:style>
           <p:txBody>
             <a:bodyPr rtlCol="0" anchor="ctr"/>
+            <a:lstStyle/>
             <a:p>
               <a:pPr algn="ctr"/>
               <a:endParaRPr lang="en-US" sz="1400" dirty="0" smtClean="0"/>
@@ -3695,6 +3658,7 @@
           </p:style>
           <p:txBody>
             <a:bodyPr rtlCol="0" anchor="ctr"/>
+            <a:lstStyle/>
             <a:p>
               <a:pPr algn="ctr"/>
               <a:endParaRPr lang="en-US" sz="1400" dirty="0" smtClean="0"/>
@@ -3732,6 +3696,7 @@
           </p:style>
           <p:txBody>
             <a:bodyPr rtlCol="0" anchor="ctr"/>
+            <a:lstStyle/>
             <a:p>
               <a:pPr algn="ctr"/>
               <a:endParaRPr lang="en-US" sz="1400" dirty="0" smtClean="0"/>
@@ -3823,19 +3788,6 @@
               </a:rPr>
               <a:t>CASE STUDY - CREATIVE FURNITURE</a:t>
             </a:r>
-            <a:endParaRPr lang="en-US" b="1">
-              <a:solidFill>
-                <a:schemeClr val="tx1"/>
-              </a:solidFill>
-              <a:effectLst>
-                <a:outerShdw blurRad="38100" dist="19050" dir="2700000" algn="tl" rotWithShape="0">
-                  <a:schemeClr val="dk1">
-                    <a:alpha val="40000"/>
-                  </a:schemeClr>
-                </a:outerShdw>
-              </a:effectLst>
-              <a:latin typeface="+mj-lt"/>
-            </a:endParaRPr>
           </a:p>
         </p:txBody>
       </p:sp>
@@ -3884,6 +3836,7 @@
           </p:style>
           <p:txBody>
             <a:bodyPr rtlCol="0" anchor="ctr"/>
+            <a:lstStyle/>
             <a:p>
               <a:pPr algn="ctr"/>
               <a:r>
@@ -3892,9 +3845,6 @@
                 </a:rPr>
                 <a:t>Scanned Object</a:t>
               </a:r>
-              <a:endParaRPr lang="en-US" sz="1400" dirty="0" smtClean="0">
-                <a:latin typeface="Corbel" panose="020B0503020204020204" pitchFamily="34" charset="0"/>
-              </a:endParaRPr>
             </a:p>
           </p:txBody>
         </p:sp>
@@ -3929,6 +3879,7 @@
           </p:style>
           <p:txBody>
             <a:bodyPr rtlCol="0" anchor="ctr"/>
+            <a:lstStyle/>
             <a:p>
               <a:pPr algn="ctr"/>
               <a:r>
@@ -3937,9 +3888,6 @@
                 </a:rPr>
                 <a:t>Design Transformation</a:t>
               </a:r>
-              <a:endParaRPr lang="en-US" sz="1400" dirty="0" smtClean="0">
-                <a:latin typeface="Corbel" panose="020B0503020204020204" pitchFamily="34" charset="0"/>
-              </a:endParaRPr>
             </a:p>
           </p:txBody>
         </p:sp>
@@ -3974,6 +3922,7 @@
           </p:style>
           <p:txBody>
             <a:bodyPr rtlCol="0" anchor="ctr"/>
+            <a:lstStyle/>
             <a:p>
               <a:pPr algn="ctr"/>
               <a:r>
@@ -3982,9 +3931,6 @@
                 </a:rPr>
                 <a:t>Creative Furniture</a:t>
               </a:r>
-              <a:endParaRPr lang="en-US" sz="1400" dirty="0" smtClean="0">
-                <a:latin typeface="Corbel" panose="020B0503020204020204" pitchFamily="34" charset="0"/>
-              </a:endParaRPr>
             </a:p>
           </p:txBody>
         </p:sp>
@@ -4019,6 +3965,7 @@
           </p:style>
           <p:txBody>
             <a:bodyPr rtlCol="0" anchor="ctr"/>
+            <a:lstStyle/>
             <a:p>
               <a:pPr algn="ctr"/>
               <a:r>
@@ -4027,9 +3974,6 @@
                 </a:rPr>
                 <a:t>Local Print / Deliever / Install</a:t>
               </a:r>
-              <a:endParaRPr lang="en-US" sz="1400" dirty="0" smtClean="0">
-                <a:latin typeface="Corbel" panose="020B0503020204020204" pitchFamily="34" charset="0"/>
-              </a:endParaRPr>
             </a:p>
           </p:txBody>
         </p:sp>
@@ -4064,6 +4008,7 @@
           </p:style>
           <p:txBody>
             <a:bodyPr rtlCol="0" anchor="ctr"/>
+            <a:lstStyle/>
             <a:p>
               <a:pPr algn="ctr"/>
               <a:r>
@@ -4072,9 +4017,6 @@
                 </a:rPr>
                 <a:t>Furniture Store (e.g., IKEA)</a:t>
               </a:r>
-              <a:endParaRPr lang="en-US" sz="1400" dirty="0" smtClean="0">
-                <a:latin typeface="Corbel" panose="020B0503020204020204" pitchFamily="34" charset="0"/>
-              </a:endParaRPr>
             </a:p>
           </p:txBody>
         </p:sp>
@@ -4109,6 +4051,7 @@
           </p:style>
           <p:txBody>
             <a:bodyPr rtlCol="0" anchor="ctr"/>
+            <a:lstStyle/>
             <a:p>
               <a:pPr algn="ctr"/>
               <a:endParaRPr lang="en-US" sz="1400" dirty="0" smtClean="0"/>
@@ -4146,6 +4089,7 @@
           </p:style>
           <p:txBody>
             <a:bodyPr rtlCol="0" anchor="ctr"/>
+            <a:lstStyle/>
             <a:p>
               <a:pPr algn="ctr"/>
               <a:endParaRPr lang="en-US" sz="1400" dirty="0" smtClean="0"/>
@@ -4183,6 +4127,7 @@
           </p:style>
           <p:txBody>
             <a:bodyPr rtlCol="0" anchor="ctr"/>
+            <a:lstStyle/>
             <a:p>
               <a:pPr algn="ctr"/>
               <a:endParaRPr lang="en-US" sz="1400" dirty="0" smtClean="0"/>
@@ -4220,6 +4165,7 @@
           </p:style>
           <p:txBody>
             <a:bodyPr rtlCol="0" anchor="ctr"/>
+            <a:lstStyle/>
             <a:p>
               <a:pPr algn="ctr"/>
               <a:endParaRPr lang="en-US" sz="1400" dirty="0" smtClean="0"/>
@@ -4247,6 +4193,7 @@
           <a:bodyPr wrap="none" rtlCol="0">
             <a:spAutoFit/>
           </a:bodyPr>
+          <a:lstStyle/>
           <a:p>
             <a:r>
               <a:rPr lang="en-US">
@@ -4256,11 +4203,6 @@
               </a:rPr>
               <a:t>Anyone can scan something.</a:t>
             </a:r>
-            <a:endParaRPr lang="en-US">
-              <a:solidFill>
-                <a:schemeClr val="bg1"/>
-              </a:solidFill>
-            </a:endParaRPr>
           </a:p>
         </p:txBody>
       </p:sp>
@@ -4284,6 +4226,7 @@
           <a:bodyPr wrap="square" rtlCol="0">
             <a:spAutoFit/>
           </a:bodyPr>
+          <a:lstStyle/>
           <a:p>
             <a:r>
               <a:rPr lang="en-US">
@@ -4293,11 +4236,6 @@
               </a:rPr>
               <a:t>Our software platform provides user with the ability to be more “Creative” to design something unique on their own.</a:t>
             </a:r>
-            <a:endParaRPr lang="en-US">
-              <a:solidFill>
-                <a:schemeClr val="bg1"/>
-              </a:solidFill>
-            </a:endParaRPr>
           </a:p>
         </p:txBody>
       </p:sp>
@@ -4321,6 +4259,7 @@
           <a:bodyPr wrap="square" rtlCol="0">
             <a:spAutoFit/>
           </a:bodyPr>
+          <a:lstStyle/>
           <a:p>
             <a:r>
               <a:rPr lang="en-US">
@@ -4330,11 +4269,6 @@
               </a:rPr>
               <a:t>All furniture designs can be shopped and custom sized.</a:t>
             </a:r>
-            <a:endParaRPr lang="en-US">
-              <a:solidFill>
-                <a:schemeClr val="bg1"/>
-              </a:solidFill>
-            </a:endParaRPr>
           </a:p>
         </p:txBody>
       </p:sp>
@@ -4358,6 +4292,7 @@
           <a:bodyPr wrap="square" rtlCol="0">
             <a:spAutoFit/>
           </a:bodyPr>
+          <a:lstStyle/>
           <a:p>
             <a:r>
               <a:rPr lang="en-US">
@@ -4367,11 +4302,6 @@
               </a:rPr>
               <a:t>We can develop our own patented 3D furniture printer and sell it.</a:t>
             </a:r>
-            <a:endParaRPr lang="en-US">
-              <a:solidFill>
-                <a:schemeClr val="bg1"/>
-              </a:solidFill>
-            </a:endParaRPr>
           </a:p>
           <a:p>
             <a:r>
@@ -4382,11 +4312,6 @@
               </a:rPr>
               <a:t>We can collaborate with local 3D studio to manufacture, deliver  and install. </a:t>
             </a:r>
-            <a:endParaRPr lang="en-US">
-              <a:solidFill>
-                <a:schemeClr val="bg1"/>
-              </a:solidFill>
-            </a:endParaRPr>
           </a:p>
         </p:txBody>
       </p:sp>
@@ -4727,9 +4652,10 @@
       </a:style>
     </a:lnDef>
   </a:objectDefaults>
+  <a:extraClrSchemeLst/>
   <a:extLst>
     <a:ext uri="{05A4C25C-085E-4340-85A3-A5531E510DB2}">
-      <thm15:themeFamily xmlns:thm15="http://schemas.microsoft.com/office/thememl/2012/main" name="Office Theme" id="{62F939B6-93AF-4DB8-9C6B-D6C7DFDC589F}" vid="{4A3C46E8-61CC-4603-A589-7422A47A8E4A}"/>
+      <thm15:themeFamily xmlns:thm15="http://schemas.microsoft.com/office/thememl/2012/main" xmlns="" name="Office Theme" id="{62F939B6-93AF-4DB8-9C6B-D6C7DFDC589F}" vid="{4A3C46E8-61CC-4603-A589-7422A47A8E4A}"/>
     </a:ext>
   </a:extLst>
 </a:theme>

</xml_diff>